<commit_message>
Sista korrigeringarna innan presentationen
</commit_message>
<xml_diff>
--- a/presentation/presentation-bildspel.pptx
+++ b/presentation/presentation-bildspel.pptx
@@ -252,7 +252,8 @@
           <a:p>
             <a:fld id="{215B6FB1-0B11-4201-831A-10C81C9D5386}" type="datetimeFigureOut">
               <a:rPr lang="sv-SE" smtClean="0"/>
-              <a:t>2014-10-26</a:t>
+              <a:pPr/>
+              <a:t>2014-10-27</a:t>
             </a:fld>
             <a:endParaRPr lang="sv-SE"/>
           </a:p>
@@ -298,6 +299,7 @@
           <a:p>
             <a:fld id="{C4ADAE99-796E-42B9-A2D8-EF02FF313B10}" type="slidenum">
               <a:rPr lang="sv-SE" smtClean="0"/>
+              <a:pPr/>
               <a:t>‹#›</a:t>
             </a:fld>
             <a:endParaRPr lang="sv-SE"/>
@@ -565,7 +567,8 @@
           <a:p>
             <a:fld id="{215B6FB1-0B11-4201-831A-10C81C9D5386}" type="datetimeFigureOut">
               <a:rPr lang="sv-SE" smtClean="0"/>
-              <a:t>2014-10-26</a:t>
+              <a:pPr/>
+              <a:t>2014-10-27</a:t>
             </a:fld>
             <a:endParaRPr lang="sv-SE"/>
           </a:p>
@@ -611,6 +614,7 @@
           <a:p>
             <a:fld id="{C4ADAE99-796E-42B9-A2D8-EF02FF313B10}" type="slidenum">
               <a:rPr lang="sv-SE" smtClean="0"/>
+              <a:pPr/>
               <a:t>‹#›</a:t>
             </a:fld>
             <a:endParaRPr lang="sv-SE"/>
@@ -750,7 +754,8 @@
           <a:p>
             <a:fld id="{215B6FB1-0B11-4201-831A-10C81C9D5386}" type="datetimeFigureOut">
               <a:rPr lang="sv-SE" smtClean="0"/>
-              <a:t>2014-10-26</a:t>
+              <a:pPr/>
+              <a:t>2014-10-27</a:t>
             </a:fld>
             <a:endParaRPr lang="sv-SE"/>
           </a:p>
@@ -796,6 +801,7 @@
           <a:p>
             <a:fld id="{C4ADAE99-796E-42B9-A2D8-EF02FF313B10}" type="slidenum">
               <a:rPr lang="sv-SE" smtClean="0"/>
+              <a:pPr/>
               <a:t>‹#›</a:t>
             </a:fld>
             <a:endParaRPr lang="sv-SE"/>
@@ -925,7 +931,8 @@
           <a:p>
             <a:fld id="{215B6FB1-0B11-4201-831A-10C81C9D5386}" type="datetimeFigureOut">
               <a:rPr lang="sv-SE" smtClean="0"/>
-              <a:t>2014-10-26</a:t>
+              <a:pPr/>
+              <a:t>2014-10-27</a:t>
             </a:fld>
             <a:endParaRPr lang="sv-SE"/>
           </a:p>
@@ -971,6 +978,7 @@
           <a:p>
             <a:fld id="{C4ADAE99-796E-42B9-A2D8-EF02FF313B10}" type="slidenum">
               <a:rPr lang="sv-SE" smtClean="0"/>
+              <a:pPr/>
               <a:t>‹#›</a:t>
             </a:fld>
             <a:endParaRPr lang="sv-SE"/>
@@ -1193,7 +1201,8 @@
           <a:p>
             <a:fld id="{215B6FB1-0B11-4201-831A-10C81C9D5386}" type="datetimeFigureOut">
               <a:rPr lang="sv-SE" smtClean="0"/>
-              <a:t>2014-10-26</a:t>
+              <a:pPr/>
+              <a:t>2014-10-27</a:t>
             </a:fld>
             <a:endParaRPr lang="sv-SE"/>
           </a:p>
@@ -1239,6 +1248,7 @@
           <a:p>
             <a:fld id="{C4ADAE99-796E-42B9-A2D8-EF02FF313B10}" type="slidenum">
               <a:rPr lang="sv-SE" smtClean="0"/>
+              <a:pPr/>
               <a:t>‹#›</a:t>
             </a:fld>
             <a:endParaRPr lang="sv-SE"/>
@@ -1661,7 +1671,8 @@
           <a:p>
             <a:fld id="{215B6FB1-0B11-4201-831A-10C81C9D5386}" type="datetimeFigureOut">
               <a:rPr lang="sv-SE" smtClean="0"/>
-              <a:t>2014-10-26</a:t>
+              <a:pPr/>
+              <a:t>2014-10-27</a:t>
             </a:fld>
             <a:endParaRPr lang="sv-SE"/>
           </a:p>
@@ -1707,6 +1718,7 @@
           <a:p>
             <a:fld id="{C4ADAE99-796E-42B9-A2D8-EF02FF313B10}" type="slidenum">
               <a:rPr lang="sv-SE" smtClean="0"/>
+              <a:pPr/>
               <a:t>‹#›</a:t>
             </a:fld>
             <a:endParaRPr lang="sv-SE"/>
@@ -2150,7 +2162,8 @@
           <a:p>
             <a:fld id="{215B6FB1-0B11-4201-831A-10C81C9D5386}" type="datetimeFigureOut">
               <a:rPr lang="sv-SE" smtClean="0"/>
-              <a:t>2014-10-26</a:t>
+              <a:pPr/>
+              <a:t>2014-10-27</a:t>
             </a:fld>
             <a:endParaRPr lang="sv-SE"/>
           </a:p>
@@ -2196,6 +2209,7 @@
           <a:p>
             <a:fld id="{C4ADAE99-796E-42B9-A2D8-EF02FF313B10}" type="slidenum">
               <a:rPr lang="sv-SE" smtClean="0"/>
+              <a:pPr/>
               <a:t>‹#›</a:t>
             </a:fld>
             <a:endParaRPr lang="sv-SE"/>
@@ -2276,7 +2290,8 @@
           <a:p>
             <a:fld id="{215B6FB1-0B11-4201-831A-10C81C9D5386}" type="datetimeFigureOut">
               <a:rPr lang="sv-SE" smtClean="0"/>
-              <a:t>2014-10-26</a:t>
+              <a:pPr/>
+              <a:t>2014-10-27</a:t>
             </a:fld>
             <a:endParaRPr lang="sv-SE"/>
           </a:p>
@@ -2322,6 +2337,7 @@
           <a:p>
             <a:fld id="{C4ADAE99-796E-42B9-A2D8-EF02FF313B10}" type="slidenum">
               <a:rPr lang="sv-SE" smtClean="0"/>
+              <a:pPr/>
               <a:t>‹#›</a:t>
             </a:fld>
             <a:endParaRPr lang="sv-SE"/>
@@ -2420,7 +2436,8 @@
           <a:p>
             <a:fld id="{215B6FB1-0B11-4201-831A-10C81C9D5386}" type="datetimeFigureOut">
               <a:rPr lang="sv-SE" smtClean="0"/>
-              <a:t>2014-10-26</a:t>
+              <a:pPr/>
+              <a:t>2014-10-27</a:t>
             </a:fld>
             <a:endParaRPr lang="sv-SE"/>
           </a:p>
@@ -2466,6 +2483,7 @@
           <a:p>
             <a:fld id="{C4ADAE99-796E-42B9-A2D8-EF02FF313B10}" type="slidenum">
               <a:rPr lang="sv-SE" smtClean="0"/>
+              <a:pPr/>
               <a:t>‹#›</a:t>
             </a:fld>
             <a:endParaRPr lang="sv-SE"/>
@@ -2742,7 +2760,8 @@
           <a:p>
             <a:fld id="{215B6FB1-0B11-4201-831A-10C81C9D5386}" type="datetimeFigureOut">
               <a:rPr lang="sv-SE" smtClean="0"/>
-              <a:t>2014-10-26</a:t>
+              <a:pPr/>
+              <a:t>2014-10-27</a:t>
             </a:fld>
             <a:endParaRPr lang="sv-SE"/>
           </a:p>
@@ -2788,6 +2807,7 @@
           <a:p>
             <a:fld id="{C4ADAE99-796E-42B9-A2D8-EF02FF313B10}" type="slidenum">
               <a:rPr lang="sv-SE" smtClean="0"/>
+              <a:pPr/>
               <a:t>‹#›</a:t>
             </a:fld>
             <a:endParaRPr lang="sv-SE"/>
@@ -2876,7 +2896,8 @@
           <a:p>
             <a:fld id="{215B6FB1-0B11-4201-831A-10C81C9D5386}" type="datetimeFigureOut">
               <a:rPr lang="sv-SE" smtClean="0"/>
-              <a:t>2014-10-26</a:t>
+              <a:pPr/>
+              <a:t>2014-10-27</a:t>
             </a:fld>
             <a:endParaRPr lang="sv-SE"/>
           </a:p>
@@ -2922,6 +2943,7 @@
           <a:p>
             <a:fld id="{C4ADAE99-796E-42B9-A2D8-EF02FF313B10}" type="slidenum">
               <a:rPr lang="sv-SE" smtClean="0"/>
+              <a:pPr/>
               <a:t>‹#›</a:t>
             </a:fld>
             <a:endParaRPr lang="sv-SE"/>
@@ -3657,7 +3679,8 @@
           <a:p>
             <a:fld id="{215B6FB1-0B11-4201-831A-10C81C9D5386}" type="datetimeFigureOut">
               <a:rPr lang="sv-SE" smtClean="0"/>
-              <a:t>2014-10-26</a:t>
+              <a:pPr/>
+              <a:t>2014-10-27</a:t>
             </a:fld>
             <a:endParaRPr lang="sv-SE"/>
           </a:p>
@@ -3741,6 +3764,7 @@
           <a:p>
             <a:fld id="{C4ADAE99-796E-42B9-A2D8-EF02FF313B10}" type="slidenum">
               <a:rPr lang="sv-SE" smtClean="0"/>
+              <a:pPr/>
               <a:t>‹#›</a:t>
             </a:fld>
             <a:endParaRPr lang="sv-SE"/>
@@ -4175,6 +4199,9 @@
           <a:prstGeom prst="rect">
             <a:avLst/>
           </a:prstGeom>
+          <a:solidFill>
+            <a:schemeClr val="bg1"/>
+          </a:solidFill>
         </p:spPr>
       </p:pic>
     </p:spTree>
@@ -4182,6 +4209,13 @@
   <p:clrMapOvr>
     <a:masterClrMapping/>
   </p:clrMapOvr>
+  <p:timing>
+    <p:tnLst>
+      <p:par>
+        <p:cTn id="1" dur="indefinite" restart="never" nodeType="tmRoot"/>
+      </p:par>
+    </p:tnLst>
+  </p:timing>
 </p:sld>
 </file>
 
@@ -4342,6 +4376,13 @@
   <p:clrMapOvr>
     <a:masterClrMapping/>
   </p:clrMapOvr>
+  <p:timing>
+    <p:tnLst>
+      <p:par>
+        <p:cTn id="1" dur="indefinite" restart="never" nodeType="tmRoot"/>
+      </p:par>
+    </p:tnLst>
+  </p:timing>
 </p:sld>
 </file>
 
@@ -4408,12 +4449,6 @@
           <a:p>
             <a:r>
               <a:rPr lang="sv-SE" dirty="0" smtClean="0"/>
-              <a:t>PDO</a:t>
-            </a:r>
-          </a:p>
-          <a:p>
-            <a:r>
-              <a:rPr lang="sv-SE" dirty="0" smtClean="0"/>
               <a:t>HTML - &lt;</a:t>
             </a:r>
             <a:r>
@@ -4431,6 +4466,57 @@
             <a:r>
               <a:rPr lang="sv-SE" dirty="0" smtClean="0"/>
               <a:t>&gt;</a:t>
+            </a:r>
+            <a:endParaRPr lang="sv-SE" dirty="0" smtClean="0"/>
+          </a:p>
+          <a:p>
+            <a:r>
+              <a:rPr lang="sv-SE" dirty="0" smtClean="0"/>
+              <a:t>PDO</a:t>
+            </a:r>
+            <a:br>
+              <a:rPr lang="sv-SE" dirty="0" smtClean="0"/>
+            </a:br>
+            <a:r>
+              <a:rPr lang="sv-SE" dirty="0" smtClean="0"/>
+              <a:t/>
+            </a:r>
+            <a:br>
+              <a:rPr lang="sv-SE" dirty="0" smtClean="0"/>
+            </a:br>
+            <a:r>
+              <a:rPr lang="sv-SE" sz="2400" dirty="0" smtClean="0"/>
+              <a:t>mysql:host=</a:t>
+            </a:r>
+            <a:r>
+              <a:rPr lang="sv-SE" sz="2400" b="1" dirty="0" smtClean="0"/>
+              <a:t>localhost</a:t>
+            </a:r>
+            <a:r>
+              <a:rPr lang="sv-SE" sz="2400" dirty="0" smtClean="0"/>
+              <a:t>;dbname=quizapp;charset=utf8</a:t>
+            </a:r>
+            <a:br>
+              <a:rPr lang="sv-SE" sz="2400" dirty="0" smtClean="0"/>
+            </a:br>
+            <a:r>
+              <a:rPr lang="sv-SE" sz="2400" dirty="0" smtClean="0"/>
+              <a:t/>
+            </a:r>
+            <a:br>
+              <a:rPr lang="sv-SE" sz="2400" dirty="0" smtClean="0"/>
+            </a:br>
+            <a:r>
+              <a:rPr lang="sv-SE" sz="2400" dirty="0" smtClean="0"/>
+              <a:t>mysql:host=</a:t>
+            </a:r>
+            <a:r>
+              <a:rPr lang="sv-SE" sz="2400" b="1" dirty="0" smtClean="0"/>
+              <a:t>127.0.0.1</a:t>
+            </a:r>
+            <a:r>
+              <a:rPr lang="sv-SE" sz="2400" dirty="0" smtClean="0"/>
+              <a:t>;dbname=quizapp;charset=utf8</a:t>
             </a:r>
           </a:p>
         </p:txBody>
@@ -4440,6 +4526,13 @@
   <p:clrMapOvr>
     <a:masterClrMapping/>
   </p:clrMapOvr>
+  <p:timing>
+    <p:tnLst>
+      <p:par>
+        <p:cTn id="1" dur="indefinite" restart="never" nodeType="tmRoot"/>
+      </p:par>
+    </p:tnLst>
+  </p:timing>
 </p:sld>
 </file>
 
@@ -4510,13 +4603,11 @@
           <a:p>
             <a:r>
               <a:rPr lang="sv-SE" dirty="0" smtClean="0"/>
-              <a:t>PHP alternativa syntax</a:t>
-            </a:r>
-          </a:p>
-          <a:p>
-            <a:r>
-              <a:rPr lang="sv-SE" dirty="0" err="1" smtClean="0"/>
-              <a:t>JQuery</a:t>
+              <a:t>PHP alternativa </a:t>
+            </a:r>
+            <a:r>
+              <a:rPr lang="sv-SE" dirty="0" smtClean="0"/>
+              <a:t>syntax</a:t>
             </a:r>
             <a:endParaRPr lang="sv-SE" dirty="0" smtClean="0"/>
           </a:p>
@@ -4533,6 +4624,13 @@
   <p:clrMapOvr>
     <a:masterClrMapping/>
   </p:clrMapOvr>
+  <p:timing>
+    <p:tnLst>
+      <p:par>
+        <p:cTn id="1" dur="indefinite" restart="never" nodeType="tmRoot"/>
+      </p:par>
+    </p:tnLst>
+  </p:timing>
 </p:sld>
 </file>
 
@@ -4646,6 +4744,13 @@
   <p:clrMapOvr>
     <a:masterClrMapping/>
   </p:clrMapOvr>
+  <p:timing>
+    <p:tnLst>
+      <p:par>
+        <p:cTn id="1" dur="indefinite" restart="never" nodeType="tmRoot"/>
+      </p:par>
+    </p:tnLst>
+  </p:timing>
 </p:sld>
 </file>
 
@@ -4741,6 +4846,13 @@
   <p:clrMapOvr>
     <a:masterClrMapping/>
   </p:clrMapOvr>
+  <p:timing>
+    <p:tnLst>
+      <p:par>
+        <p:cTn id="1" dur="indefinite" restart="never" nodeType="tmRoot"/>
+      </p:par>
+    </p:tnLst>
+  </p:timing>
 </p:sld>
 </file>
 
@@ -4811,15 +4923,7 @@
             </a:r>
             <a:r>
               <a:rPr lang="sv-SE" sz="2800" dirty="0" smtClean="0"/>
-              <a:t> </a:t>
-            </a:r>
-            <a:r>
-              <a:rPr lang="sv-SE" sz="2800" dirty="0" smtClean="0"/>
-              <a:t>såväl som från handhållna enheter</a:t>
-            </a:r>
-            <a:r>
-              <a:rPr lang="sv-SE" sz="2800" dirty="0" smtClean="0"/>
-              <a:t>.</a:t>
+              <a:t> såväl som från handhållna enheter.</a:t>
             </a:r>
           </a:p>
           <a:p>
@@ -4841,25 +4945,13 @@
             </a:r>
             <a:r>
               <a:rPr lang="sv-SE" sz="2800" dirty="0" smtClean="0"/>
-              <a:t> och Safari</a:t>
-            </a:r>
+              <a:t> och Safari.</a:t>
+            </a:r>
+          </a:p>
+          <a:p>
             <a:r>
               <a:rPr lang="sv-SE" sz="2800" dirty="0" smtClean="0"/>
-              <a:t>.</a:t>
-            </a:r>
-          </a:p>
-          <a:p>
-            <a:r>
-              <a:rPr lang="sv-SE" sz="2800" dirty="0" smtClean="0"/>
-              <a:t>Kurslärare och administratörer ska </a:t>
-            </a:r>
-            <a:r>
-              <a:rPr lang="sv-SE" sz="2800" dirty="0" smtClean="0"/>
-              <a:t>enkelt </a:t>
-            </a:r>
-            <a:r>
-              <a:rPr lang="sv-SE" sz="2800" dirty="0" smtClean="0"/>
-              <a:t>kunna hantera </a:t>
+              <a:t>Kurslärare och administratörer ska enkelt kunna hantera </a:t>
             </a:r>
             <a:r>
               <a:rPr lang="sv-SE" sz="2800" dirty="0" err="1" smtClean="0"/>
@@ -4878,6 +4970,13 @@
   <p:clrMapOvr>
     <a:masterClrMapping/>
   </p:clrMapOvr>
+  <p:timing>
+    <p:tnLst>
+      <p:par>
+        <p:cTn id="1" dur="indefinite" restart="never" nodeType="tmRoot"/>
+      </p:par>
+    </p:tnLst>
+  </p:timing>
 </p:sld>
 </file>
 
@@ -4981,6 +5080,13 @@
   <p:clrMapOvr>
     <a:masterClrMapping/>
   </p:clrMapOvr>
+  <p:timing>
+    <p:tnLst>
+      <p:par>
+        <p:cTn id="1" dur="indefinite" restart="never" nodeType="tmRoot"/>
+      </p:par>
+    </p:tnLst>
+  </p:timing>
 </p:sld>
 </file>
 
@@ -5084,6 +5190,13 @@
   <p:clrMapOvr>
     <a:masterClrMapping/>
   </p:clrMapOvr>
+  <p:timing>
+    <p:tnLst>
+      <p:par>
+        <p:cTn id="1" dur="indefinite" restart="never" nodeType="tmRoot"/>
+      </p:par>
+    </p:tnLst>
+  </p:timing>
 </p:sld>
 </file>
 
@@ -5191,6 +5304,13 @@
   <p:clrMapOvr>
     <a:masterClrMapping/>
   </p:clrMapOvr>
+  <p:timing>
+    <p:tnLst>
+      <p:par>
+        <p:cTn id="1" dur="indefinite" restart="never" nodeType="tmRoot"/>
+      </p:par>
+    </p:tnLst>
+  </p:timing>
 </p:sld>
 </file>
 
@@ -5298,6 +5418,13 @@
   <p:clrMapOvr>
     <a:masterClrMapping/>
   </p:clrMapOvr>
+  <p:timing>
+    <p:tnLst>
+      <p:par>
+        <p:cTn id="1" dur="indefinite" restart="never" nodeType="tmRoot"/>
+      </p:par>
+    </p:tnLst>
+  </p:timing>
 </p:sld>
 </file>
 
@@ -5401,6 +5528,13 @@
   <p:clrMapOvr>
     <a:masterClrMapping/>
   </p:clrMapOvr>
+  <p:timing>
+    <p:tnLst>
+      <p:par>
+        <p:cTn id="1" dur="indefinite" restart="never" nodeType="tmRoot"/>
+      </p:par>
+    </p:tnLst>
+  </p:timing>
 </p:sld>
 </file>
 

</xml_diff>